<commit_message>
modify an architecture image.
</commit_message>
<xml_diff>
--- a/images/images.pptx
+++ b/images/images.pptx
@@ -288,7 +288,7 @@
           <a:p>
             <a:fld id="{E90ED720-0104-4369-84BC-D37694168613}" type="datetimeFigureOut">
               <a:rPr kumimoji="1" lang="ja-JP" altLang="en-US" smtClean="0"/>
-              <a:t>2012/8/13</a:t>
+              <a:t>2012/8/14</a:t>
             </a:fld>
             <a:endParaRPr kumimoji="1" lang="ja-JP" altLang="en-US"/>
           </a:p>
@@ -485,7 +485,7 @@
           <a:p>
             <a:fld id="{E90ED720-0104-4369-84BC-D37694168613}" type="datetimeFigureOut">
               <a:rPr kumimoji="1" lang="ja-JP" altLang="en-US" smtClean="0"/>
-              <a:t>2012/8/13</a:t>
+              <a:t>2012/8/14</a:t>
             </a:fld>
             <a:endParaRPr kumimoji="1" lang="ja-JP" altLang="en-US"/>
           </a:p>
@@ -692,7 +692,7 @@
           <a:p>
             <a:fld id="{E90ED720-0104-4369-84BC-D37694168613}" type="datetimeFigureOut">
               <a:rPr kumimoji="1" lang="ja-JP" altLang="en-US" smtClean="0"/>
-              <a:t>2012/8/13</a:t>
+              <a:t>2012/8/14</a:t>
             </a:fld>
             <a:endParaRPr kumimoji="1" lang="ja-JP" altLang="en-US"/>
           </a:p>
@@ -889,7 +889,7 @@
           <a:p>
             <a:fld id="{E90ED720-0104-4369-84BC-D37694168613}" type="datetimeFigureOut">
               <a:rPr kumimoji="1" lang="ja-JP" altLang="en-US" smtClean="0"/>
-              <a:t>2012/8/13</a:t>
+              <a:t>2012/8/14</a:t>
             </a:fld>
             <a:endParaRPr kumimoji="1" lang="ja-JP" altLang="en-US"/>
           </a:p>
@@ -1130,7 +1130,7 @@
           <a:p>
             <a:fld id="{E90ED720-0104-4369-84BC-D37694168613}" type="datetimeFigureOut">
               <a:rPr kumimoji="1" lang="ja-JP" altLang="en-US" smtClean="0"/>
-              <a:t>2012/8/13</a:t>
+              <a:t>2012/8/14</a:t>
             </a:fld>
             <a:endParaRPr kumimoji="1" lang="ja-JP" altLang="en-US"/>
           </a:p>
@@ -1477,7 +1477,7 @@
           <a:p>
             <a:fld id="{E90ED720-0104-4369-84BC-D37694168613}" type="datetimeFigureOut">
               <a:rPr kumimoji="1" lang="ja-JP" altLang="en-US" smtClean="0"/>
-              <a:t>2012/8/13</a:t>
+              <a:t>2012/8/14</a:t>
             </a:fld>
             <a:endParaRPr kumimoji="1" lang="ja-JP" altLang="en-US"/>
           </a:p>
@@ -1958,7 +1958,7 @@
           <a:p>
             <a:fld id="{E90ED720-0104-4369-84BC-D37694168613}" type="datetimeFigureOut">
               <a:rPr kumimoji="1" lang="ja-JP" altLang="en-US" smtClean="0"/>
-              <a:t>2012/8/13</a:t>
+              <a:t>2012/8/14</a:t>
             </a:fld>
             <a:endParaRPr kumimoji="1" lang="ja-JP" altLang="en-US"/>
           </a:p>
@@ -2082,7 +2082,7 @@
           <a:p>
             <a:fld id="{E90ED720-0104-4369-84BC-D37694168613}" type="datetimeFigureOut">
               <a:rPr kumimoji="1" lang="ja-JP" altLang="en-US" smtClean="0"/>
-              <a:t>2012/8/13</a:t>
+              <a:t>2012/8/14</a:t>
             </a:fld>
             <a:endParaRPr kumimoji="1" lang="ja-JP" altLang="en-US"/>
           </a:p>
@@ -2179,7 +2179,7 @@
           <a:p>
             <a:fld id="{E90ED720-0104-4369-84BC-D37694168613}" type="datetimeFigureOut">
               <a:rPr kumimoji="1" lang="ja-JP" altLang="en-US" smtClean="0"/>
-              <a:t>2012/8/13</a:t>
+              <a:t>2012/8/14</a:t>
             </a:fld>
             <a:endParaRPr kumimoji="1" lang="ja-JP" altLang="en-US"/>
           </a:p>
@@ -2483,7 +2483,7 @@
           <a:p>
             <a:fld id="{E90ED720-0104-4369-84BC-D37694168613}" type="datetimeFigureOut">
               <a:rPr kumimoji="1" lang="ja-JP" altLang="en-US" smtClean="0"/>
-              <a:t>2012/8/13</a:t>
+              <a:t>2012/8/14</a:t>
             </a:fld>
             <a:endParaRPr kumimoji="1" lang="ja-JP" altLang="en-US"/>
           </a:p>
@@ -2731,7 +2731,7 @@
           <a:p>
             <a:fld id="{E90ED720-0104-4369-84BC-D37694168613}" type="datetimeFigureOut">
               <a:rPr kumimoji="1" lang="ja-JP" altLang="en-US" smtClean="0"/>
-              <a:t>2012/8/13</a:t>
+              <a:t>2012/8/14</a:t>
             </a:fld>
             <a:endParaRPr kumimoji="1" lang="ja-JP" altLang="en-US"/>
           </a:p>
@@ -2971,7 +2971,7 @@
           <a:p>
             <a:fld id="{E90ED720-0104-4369-84BC-D37694168613}" type="datetimeFigureOut">
               <a:rPr kumimoji="1" lang="ja-JP" altLang="en-US" smtClean="0"/>
-              <a:t>2012/8/13</a:t>
+              <a:t>2012/8/14</a:t>
             </a:fld>
             <a:endParaRPr kumimoji="1" lang="ja-JP" altLang="en-US"/>
           </a:p>
@@ -3467,7 +3467,7 @@
             <a:avLst/>
           </a:prstGeom>
           <a:solidFill>
-            <a:schemeClr val="accent3">
+            <a:schemeClr val="accent1">
               <a:lumMod val="75000"/>
             </a:schemeClr>
           </a:solidFill>
@@ -3676,11 +3676,17 @@
             <a:avLst/>
           </a:prstGeom>
           <a:solidFill>
-            <a:schemeClr val="accent6">
-              <a:lumMod val="60000"/>
-              <a:lumOff val="40000"/>
+            <a:schemeClr val="accent3">
+              <a:lumMod val="50000"/>
             </a:schemeClr>
           </a:solidFill>
+          <a:ln>
+            <a:solidFill>
+              <a:schemeClr val="accent3">
+                <a:lumMod val="50000"/>
+              </a:schemeClr>
+            </a:solidFill>
+          </a:ln>
         </p:spPr>
         <p:style>
           <a:lnRef idx="2">
@@ -3706,18 +3712,14 @@
             <a:r>
               <a:rPr kumimoji="1" lang="en-US" altLang="ja-JP" sz="1400" dirty="0" smtClean="0">
                 <a:solidFill>
-                  <a:schemeClr val="accent1">
-                    <a:lumMod val="50000"/>
-                  </a:schemeClr>
+                  <a:schemeClr val="bg1"/>
                 </a:solidFill>
               </a:rPr>
               <a:t>Log file</a:t>
             </a:r>
             <a:endParaRPr kumimoji="1" lang="ja-JP" altLang="en-US" sz="1400" dirty="0">
               <a:solidFill>
-                <a:schemeClr val="accent1">
-                  <a:lumMod val="50000"/>
-                </a:schemeClr>
+                <a:schemeClr val="bg1"/>
               </a:solidFill>
             </a:endParaRPr>
           </a:p>
@@ -3737,6 +3739,14 @@
           <a:prstGeom prst="rect">
             <a:avLst/>
           </a:prstGeom>
+          <a:solidFill>
+            <a:schemeClr val="accent3">
+              <a:lumMod val="50000"/>
+            </a:schemeClr>
+          </a:solidFill>
+          <a:ln>
+            <a:noFill/>
+          </a:ln>
         </p:spPr>
         <p:style>
           <a:lnRef idx="2">
@@ -3851,20 +3861,12 @@
           <a:p>
             <a:pPr algn="ctr"/>
             <a:r>
-              <a:rPr lang="en-US" altLang="ja-JP" sz="1400" dirty="0" err="1">
-                <a:solidFill>
-                  <a:schemeClr val="bg1"/>
-                </a:solidFill>
-              </a:rPr>
-              <a:t>m</a:t>
-            </a:r>
-            <a:r>
               <a:rPr kumimoji="1" lang="en-US" altLang="ja-JP" sz="1400" dirty="0" err="1" smtClean="0">
                 <a:solidFill>
                   <a:schemeClr val="bg1"/>
                 </a:solidFill>
               </a:rPr>
-              <a:t>ikaboshi</a:t>
+              <a:t>mikaboshi</a:t>
             </a:r>
             <a:r>
               <a:rPr kumimoji="1" lang="en-US" altLang="ja-JP" sz="1400" dirty="0" smtClean="0">
@@ -3872,15 +3874,15 @@
                   <a:schemeClr val="bg1"/>
                 </a:solidFill>
               </a:rPr>
-              <a:t>-</a:t>
-            </a:r>
-            <a:r>
-              <a:rPr kumimoji="1" lang="en-US" altLang="ja-JP" sz="1400" dirty="0" err="1" smtClean="0">
+              <a:t> </a:t>
+            </a:r>
+            <a:r>
+              <a:rPr lang="en-US" altLang="ja-JP" sz="1400" dirty="0" smtClean="0">
                 <a:solidFill>
                   <a:schemeClr val="bg1"/>
                 </a:solidFill>
               </a:rPr>
-              <a:t>jdbc</a:t>
+              <a:t>JDBC M</a:t>
             </a:r>
             <a:r>
               <a:rPr kumimoji="1" lang="en-US" altLang="ja-JP" sz="1400" dirty="0" smtClean="0">
@@ -3888,8 +3890,13 @@
                   <a:schemeClr val="bg1"/>
                 </a:solidFill>
               </a:rPr>
-              <a:t>-monitor</a:t>
-            </a:r>
+              <a:t>onitor</a:t>
+            </a:r>
+            <a:endParaRPr kumimoji="1" lang="en-US" altLang="ja-JP" sz="1400" dirty="0" smtClean="0">
+              <a:solidFill>
+                <a:schemeClr val="bg1"/>
+              </a:solidFill>
+            </a:endParaRPr>
           </a:p>
           <a:p>
             <a:pPr algn="ctr"/>
@@ -3899,7 +3906,15 @@
                   <a:schemeClr val="bg1"/>
                 </a:solidFill>
               </a:rPr>
-              <a:t>(log viewer)</a:t>
+              <a:t>(Log </a:t>
+            </a:r>
+            <a:r>
+              <a:rPr lang="en-US" altLang="ja-JP" sz="1400" dirty="0" smtClean="0">
+                <a:solidFill>
+                  <a:schemeClr val="bg1"/>
+                </a:solidFill>
+              </a:rPr>
+              <a:t>viewer)</a:t>
             </a:r>
             <a:endParaRPr kumimoji="1" lang="ja-JP" altLang="en-US" sz="1400" dirty="0">
               <a:solidFill>
@@ -3964,6 +3979,14 @@
           <a:prstGeom prst="rect">
             <a:avLst/>
           </a:prstGeom>
+          <a:solidFill>
+            <a:schemeClr val="accent3">
+              <a:lumMod val="50000"/>
+            </a:schemeClr>
+          </a:solidFill>
+          <a:ln>
+            <a:noFill/>
+          </a:ln>
         </p:spPr>
         <p:style>
           <a:lnRef idx="2">
@@ -3988,7 +4011,19 @@
             <a:pPr algn="ctr"/>
             <a:r>
               <a:rPr kumimoji="1" lang="en-US" altLang="ja-JP" sz="1400" dirty="0" err="1" smtClean="0"/>
-              <a:t>mikaboshi-jdbc-moniotor</a:t>
+              <a:t>mikaboshi</a:t>
+            </a:r>
+            <a:r>
+              <a:rPr lang="ja-JP" altLang="en-US" sz="1400" dirty="0" smtClean="0"/>
+              <a:t> </a:t>
+            </a:r>
+            <a:r>
+              <a:rPr lang="en-US" altLang="ja-JP" sz="1400" dirty="0" smtClean="0"/>
+              <a:t>JDBC M</a:t>
+            </a:r>
+            <a:r>
+              <a:rPr kumimoji="1" lang="en-US" altLang="ja-JP" sz="1400" dirty="0" smtClean="0"/>
+              <a:t>onitor</a:t>
             </a:r>
             <a:endParaRPr kumimoji="1" lang="en-US" altLang="ja-JP" sz="1400" dirty="0" smtClean="0"/>
           </a:p>
@@ -3996,7 +4031,15 @@
             <a:pPr algn="ctr"/>
             <a:r>
               <a:rPr lang="en-US" altLang="ja-JP" sz="1400" dirty="0" smtClean="0"/>
-              <a:t>(JDBC log wrapper)</a:t>
+              <a:t>(JDBC </a:t>
+            </a:r>
+            <a:r>
+              <a:rPr lang="en-US" altLang="ja-JP" sz="1400" dirty="0" smtClean="0"/>
+              <a:t>wrapper</a:t>
+            </a:r>
+            <a:r>
+              <a:rPr lang="en-US" altLang="ja-JP" sz="1400" dirty="0" smtClean="0"/>
+              <a:t>)</a:t>
             </a:r>
             <a:endParaRPr kumimoji="1" lang="ja-JP" altLang="en-US" sz="1400" dirty="0"/>
           </a:p>
@@ -4017,7 +4060,7 @@
             <a:avLst/>
           </a:prstGeom>
           <a:solidFill>
-            <a:schemeClr val="accent3">
+            <a:schemeClr val="accent1">
               <a:lumMod val="75000"/>
             </a:schemeClr>
           </a:solidFill>

</xml_diff>